<commit_message>
added new parallelization to presentation
</commit_message>
<xml_diff>
--- a/presentation/LocalBinaryPattern.pptx
+++ b/presentation/LocalBinaryPattern.pptx
@@ -5,10 +5,10 @@
     <p:sldMasterId id="2147483648" r:id="rId1"/>
   </p:sldMasterIdLst>
   <p:notesMasterIdLst>
-    <p:notesMasterId r:id="rId19"/>
+    <p:notesMasterId r:id="rId22"/>
   </p:notesMasterIdLst>
   <p:handoutMasterIdLst>
-    <p:handoutMasterId r:id="rId20"/>
+    <p:handoutMasterId r:id="rId23"/>
   </p:handoutMasterIdLst>
   <p:sldIdLst>
     <p:sldId id="256" r:id="rId2"/>
@@ -28,6 +28,9 @@
     <p:sldId id="267" r:id="rId16"/>
     <p:sldId id="268" r:id="rId17"/>
     <p:sldId id="270" r:id="rId18"/>
+    <p:sldId id="281" r:id="rId19"/>
+    <p:sldId id="282" r:id="rId20"/>
+    <p:sldId id="283" r:id="rId21"/>
   </p:sldIdLst>
   <p:sldSz cx="9144000" cy="6858000" type="screen4x3"/>
   <p:notesSz cx="6858000" cy="9144000"/>
@@ -152,6 +155,9 @@
             <p14:sldId id="267"/>
             <p14:sldId id="268"/>
             <p14:sldId id="270"/>
+            <p14:sldId id="281"/>
+            <p14:sldId id="282"/>
+            <p14:sldId id="283"/>
           </p14:sldIdLst>
         </p14:section>
       </p14:sectionLst>
@@ -257,7 +263,7 @@
             <a:fld id="{45BF3CCC-77DD-F84F-A249-CA3C5045A043}" type="datetime1">
               <a:rPr lang="it-IT" smtClean="0"/>
               <a:pPr/>
-              <a:t>21/01/2023</a:t>
+              <a:t>27/01/2023</a:t>
             </a:fld>
             <a:endParaRPr lang="it-IT"/>
           </a:p>
@@ -425,7 +431,7 @@
             <a:fld id="{FE692227-D6DC-FD45-9507-DB2BAD58473C}" type="datetime1">
               <a:rPr lang="it-IT" smtClean="0"/>
               <a:pPr/>
-              <a:t>21/01/2023</a:t>
+              <a:t>27/01/2023</a:t>
             </a:fld>
             <a:endParaRPr lang="it-IT"/>
           </a:p>
@@ -1374,6 +1380,261 @@
 </p:notes>
 </file>
 
+<file path=ppt/notesSlides/notesSlide17.xml><?xml version="1.0" encoding="utf-8"?>
+<p:notes xmlns:a="http://schemas.openxmlformats.org/drawingml/2006/main" xmlns:r="http://schemas.openxmlformats.org/officeDocument/2006/relationships" xmlns:p="http://schemas.openxmlformats.org/presentationml/2006/main">
+  <p:cSld>
+    <p:spTree>
+      <p:nvGrpSpPr>
+        <p:cNvPr id="1" name=""/>
+        <p:cNvGrpSpPr/>
+        <p:nvPr/>
+      </p:nvGrpSpPr>
+      <p:grpSpPr>
+        <a:xfrm>
+          <a:off x="0" y="0"/>
+          <a:ext cx="0" cy="0"/>
+          <a:chOff x="0" y="0"/>
+          <a:chExt cx="0" cy="0"/>
+        </a:xfrm>
+      </p:grpSpPr>
+      <p:sp>
+        <p:nvSpPr>
+          <p:cNvPr id="2" name="Segnaposto immagine diapositiva 1"/>
+          <p:cNvSpPr>
+            <a:spLocks noGrp="1" noRot="1" noChangeAspect="1"/>
+          </p:cNvSpPr>
+          <p:nvPr>
+            <p:ph type="sldImg"/>
+          </p:nvPr>
+        </p:nvSpPr>
+        <p:spPr/>
+      </p:sp>
+      <p:sp>
+        <p:nvSpPr>
+          <p:cNvPr id="3" name="Segnaposto note 2"/>
+          <p:cNvSpPr>
+            <a:spLocks noGrp="1"/>
+          </p:cNvSpPr>
+          <p:nvPr>
+            <p:ph type="body" idx="1"/>
+          </p:nvPr>
+        </p:nvSpPr>
+        <p:spPr/>
+        <p:txBody>
+          <a:bodyPr/>
+          <a:lstStyle/>
+          <a:p>
+            <a:endParaRPr lang="it-IT"/>
+          </a:p>
+        </p:txBody>
+      </p:sp>
+      <p:sp>
+        <p:nvSpPr>
+          <p:cNvPr id="4" name="Segnaposto numero diapositiva 3"/>
+          <p:cNvSpPr>
+            <a:spLocks noGrp="1"/>
+          </p:cNvSpPr>
+          <p:nvPr>
+            <p:ph type="sldNum" sz="quarter" idx="10"/>
+          </p:nvPr>
+        </p:nvSpPr>
+        <p:spPr/>
+        <p:txBody>
+          <a:bodyPr/>
+          <a:lstStyle/>
+          <a:p>
+            <a:fld id="{96986711-015B-0142-88C4-65D50E44FA77}" type="slidenum">
+              <a:rPr lang="it-IT" smtClean="0"/>
+              <a:pPr/>
+              <a:t>18</a:t>
+            </a:fld>
+            <a:endParaRPr lang="it-IT"/>
+          </a:p>
+        </p:txBody>
+      </p:sp>
+    </p:spTree>
+    <p:extLst>
+      <p:ext uri="{BB962C8B-B14F-4D97-AF65-F5344CB8AC3E}">
+        <p14:creationId xmlns:p14="http://schemas.microsoft.com/office/powerpoint/2010/main" val="3718640737"/>
+      </p:ext>
+    </p:extLst>
+  </p:cSld>
+  <p:clrMapOvr>
+    <a:masterClrMapping/>
+  </p:clrMapOvr>
+</p:notes>
+</file>
+
+<file path=ppt/notesSlides/notesSlide18.xml><?xml version="1.0" encoding="utf-8"?>
+<p:notes xmlns:a="http://schemas.openxmlformats.org/drawingml/2006/main" xmlns:r="http://schemas.openxmlformats.org/officeDocument/2006/relationships" xmlns:p="http://schemas.openxmlformats.org/presentationml/2006/main">
+  <p:cSld>
+    <p:spTree>
+      <p:nvGrpSpPr>
+        <p:cNvPr id="1" name=""/>
+        <p:cNvGrpSpPr/>
+        <p:nvPr/>
+      </p:nvGrpSpPr>
+      <p:grpSpPr>
+        <a:xfrm>
+          <a:off x="0" y="0"/>
+          <a:ext cx="0" cy="0"/>
+          <a:chOff x="0" y="0"/>
+          <a:chExt cx="0" cy="0"/>
+        </a:xfrm>
+      </p:grpSpPr>
+      <p:sp>
+        <p:nvSpPr>
+          <p:cNvPr id="2" name="Segnaposto immagine diapositiva 1"/>
+          <p:cNvSpPr>
+            <a:spLocks noGrp="1" noRot="1" noChangeAspect="1"/>
+          </p:cNvSpPr>
+          <p:nvPr>
+            <p:ph type="sldImg"/>
+          </p:nvPr>
+        </p:nvSpPr>
+        <p:spPr/>
+      </p:sp>
+      <p:sp>
+        <p:nvSpPr>
+          <p:cNvPr id="3" name="Segnaposto note 2"/>
+          <p:cNvSpPr>
+            <a:spLocks noGrp="1"/>
+          </p:cNvSpPr>
+          <p:nvPr>
+            <p:ph type="body" idx="1"/>
+          </p:nvPr>
+        </p:nvSpPr>
+        <p:spPr/>
+        <p:txBody>
+          <a:bodyPr/>
+          <a:lstStyle/>
+          <a:p>
+            <a:endParaRPr lang="it-IT"/>
+          </a:p>
+        </p:txBody>
+      </p:sp>
+      <p:sp>
+        <p:nvSpPr>
+          <p:cNvPr id="4" name="Segnaposto numero diapositiva 3"/>
+          <p:cNvSpPr>
+            <a:spLocks noGrp="1"/>
+          </p:cNvSpPr>
+          <p:nvPr>
+            <p:ph type="sldNum" sz="quarter" idx="10"/>
+          </p:nvPr>
+        </p:nvSpPr>
+        <p:spPr/>
+        <p:txBody>
+          <a:bodyPr/>
+          <a:lstStyle/>
+          <a:p>
+            <a:fld id="{96986711-015B-0142-88C4-65D50E44FA77}" type="slidenum">
+              <a:rPr lang="it-IT" smtClean="0"/>
+              <a:pPr/>
+              <a:t>19</a:t>
+            </a:fld>
+            <a:endParaRPr lang="it-IT"/>
+          </a:p>
+        </p:txBody>
+      </p:sp>
+    </p:spTree>
+    <p:extLst>
+      <p:ext uri="{BB962C8B-B14F-4D97-AF65-F5344CB8AC3E}">
+        <p14:creationId xmlns:p14="http://schemas.microsoft.com/office/powerpoint/2010/main" val="1917004503"/>
+      </p:ext>
+    </p:extLst>
+  </p:cSld>
+  <p:clrMapOvr>
+    <a:masterClrMapping/>
+  </p:clrMapOvr>
+</p:notes>
+</file>
+
+<file path=ppt/notesSlides/notesSlide19.xml><?xml version="1.0" encoding="utf-8"?>
+<p:notes xmlns:a="http://schemas.openxmlformats.org/drawingml/2006/main" xmlns:r="http://schemas.openxmlformats.org/officeDocument/2006/relationships" xmlns:p="http://schemas.openxmlformats.org/presentationml/2006/main">
+  <p:cSld>
+    <p:spTree>
+      <p:nvGrpSpPr>
+        <p:cNvPr id="1" name=""/>
+        <p:cNvGrpSpPr/>
+        <p:nvPr/>
+      </p:nvGrpSpPr>
+      <p:grpSpPr>
+        <a:xfrm>
+          <a:off x="0" y="0"/>
+          <a:ext cx="0" cy="0"/>
+          <a:chOff x="0" y="0"/>
+          <a:chExt cx="0" cy="0"/>
+        </a:xfrm>
+      </p:grpSpPr>
+      <p:sp>
+        <p:nvSpPr>
+          <p:cNvPr id="2" name="Segnaposto immagine diapositiva 1"/>
+          <p:cNvSpPr>
+            <a:spLocks noGrp="1" noRot="1" noChangeAspect="1"/>
+          </p:cNvSpPr>
+          <p:nvPr>
+            <p:ph type="sldImg"/>
+          </p:nvPr>
+        </p:nvSpPr>
+        <p:spPr/>
+      </p:sp>
+      <p:sp>
+        <p:nvSpPr>
+          <p:cNvPr id="3" name="Segnaposto note 2"/>
+          <p:cNvSpPr>
+            <a:spLocks noGrp="1"/>
+          </p:cNvSpPr>
+          <p:nvPr>
+            <p:ph type="body" idx="1"/>
+          </p:nvPr>
+        </p:nvSpPr>
+        <p:spPr/>
+        <p:txBody>
+          <a:bodyPr/>
+          <a:lstStyle/>
+          <a:p>
+            <a:endParaRPr lang="it-IT"/>
+          </a:p>
+        </p:txBody>
+      </p:sp>
+      <p:sp>
+        <p:nvSpPr>
+          <p:cNvPr id="4" name="Segnaposto numero diapositiva 3"/>
+          <p:cNvSpPr>
+            <a:spLocks noGrp="1"/>
+          </p:cNvSpPr>
+          <p:nvPr>
+            <p:ph type="sldNum" sz="quarter" idx="10"/>
+          </p:nvPr>
+        </p:nvSpPr>
+        <p:spPr/>
+        <p:txBody>
+          <a:bodyPr/>
+          <a:lstStyle/>
+          <a:p>
+            <a:fld id="{96986711-015B-0142-88C4-65D50E44FA77}" type="slidenum">
+              <a:rPr lang="it-IT" smtClean="0"/>
+              <a:pPr/>
+              <a:t>20</a:t>
+            </a:fld>
+            <a:endParaRPr lang="it-IT"/>
+          </a:p>
+        </p:txBody>
+      </p:sp>
+    </p:spTree>
+    <p:extLst>
+      <p:ext uri="{BB962C8B-B14F-4D97-AF65-F5344CB8AC3E}">
+        <p14:creationId xmlns:p14="http://schemas.microsoft.com/office/powerpoint/2010/main" val="762325572"/>
+      </p:ext>
+    </p:extLst>
+  </p:cSld>
+  <p:clrMapOvr>
+    <a:masterClrMapping/>
+  </p:clrMapOvr>
+</p:notes>
+</file>
+
 <file path=ppt/notesSlides/notesSlide2.xml><?xml version="1.0" encoding="utf-8"?>
 <p:notes xmlns:a="http://schemas.openxmlformats.org/drawingml/2006/main" xmlns:r="http://schemas.openxmlformats.org/officeDocument/2006/relationships" xmlns:p="http://schemas.openxmlformats.org/presentationml/2006/main">
   <p:cSld>
@@ -2234,7 +2495,7 @@
             <a:fld id="{AD8BF249-6BAC-CD40-AAE9-334F110649E5}" type="datetimeFigureOut">
               <a:rPr lang="it-IT" smtClean="0"/>
               <a:pPr/>
-              <a:t>21/01/2023</a:t>
+              <a:t>27/01/2023</a:t>
             </a:fld>
             <a:endParaRPr lang="it-IT"/>
           </a:p>
@@ -2404,7 +2665,7 @@
             <a:fld id="{AD8BF249-6BAC-CD40-AAE9-334F110649E5}" type="datetimeFigureOut">
               <a:rPr lang="it-IT" smtClean="0"/>
               <a:pPr/>
-              <a:t>21/01/2023</a:t>
+              <a:t>27/01/2023</a:t>
             </a:fld>
             <a:endParaRPr lang="it-IT"/>
           </a:p>
@@ -2584,7 +2845,7 @@
             <a:fld id="{AD8BF249-6BAC-CD40-AAE9-334F110649E5}" type="datetimeFigureOut">
               <a:rPr lang="it-IT" smtClean="0"/>
               <a:pPr/>
-              <a:t>21/01/2023</a:t>
+              <a:t>27/01/2023</a:t>
             </a:fld>
             <a:endParaRPr lang="it-IT"/>
           </a:p>
@@ -2754,7 +3015,7 @@
             <a:fld id="{AD8BF249-6BAC-CD40-AAE9-334F110649E5}" type="datetimeFigureOut">
               <a:rPr lang="it-IT" smtClean="0"/>
               <a:pPr/>
-              <a:t>21/01/2023</a:t>
+              <a:t>27/01/2023</a:t>
             </a:fld>
             <a:endParaRPr lang="it-IT"/>
           </a:p>
@@ -3001,7 +3262,7 @@
             <a:fld id="{AD8BF249-6BAC-CD40-AAE9-334F110649E5}" type="datetimeFigureOut">
               <a:rPr lang="it-IT" smtClean="0"/>
               <a:pPr/>
-              <a:t>21/01/2023</a:t>
+              <a:t>27/01/2023</a:t>
             </a:fld>
             <a:endParaRPr lang="it-IT"/>
           </a:p>
@@ -3288,7 +3549,7 @@
             <a:fld id="{AD8BF249-6BAC-CD40-AAE9-334F110649E5}" type="datetimeFigureOut">
               <a:rPr lang="it-IT" smtClean="0"/>
               <a:pPr/>
-              <a:t>21/01/2023</a:t>
+              <a:t>27/01/2023</a:t>
             </a:fld>
             <a:endParaRPr lang="it-IT"/>
           </a:p>
@@ -3709,7 +3970,7 @@
             <a:fld id="{AD8BF249-6BAC-CD40-AAE9-334F110649E5}" type="datetimeFigureOut">
               <a:rPr lang="it-IT" smtClean="0"/>
               <a:pPr/>
-              <a:t>21/01/2023</a:t>
+              <a:t>27/01/2023</a:t>
             </a:fld>
             <a:endParaRPr lang="it-IT"/>
           </a:p>
@@ -3828,7 +4089,7 @@
             <a:fld id="{AD8BF249-6BAC-CD40-AAE9-334F110649E5}" type="datetimeFigureOut">
               <a:rPr lang="it-IT" smtClean="0"/>
               <a:pPr/>
-              <a:t>21/01/2023</a:t>
+              <a:t>27/01/2023</a:t>
             </a:fld>
             <a:endParaRPr lang="it-IT"/>
           </a:p>
@@ -3925,7 +4186,7 @@
             <a:fld id="{AD8BF249-6BAC-CD40-AAE9-334F110649E5}" type="datetimeFigureOut">
               <a:rPr lang="it-IT" smtClean="0"/>
               <a:pPr/>
-              <a:t>21/01/2023</a:t>
+              <a:t>27/01/2023</a:t>
             </a:fld>
             <a:endParaRPr lang="it-IT"/>
           </a:p>
@@ -4202,7 +4463,7 @@
             <a:fld id="{AD8BF249-6BAC-CD40-AAE9-334F110649E5}" type="datetimeFigureOut">
               <a:rPr lang="it-IT" smtClean="0"/>
               <a:pPr/>
-              <a:t>21/01/2023</a:t>
+              <a:t>27/01/2023</a:t>
             </a:fld>
             <a:endParaRPr lang="it-IT"/>
           </a:p>
@@ -4456,7 +4717,7 @@
             <a:fld id="{AD8BF249-6BAC-CD40-AAE9-334F110649E5}" type="datetimeFigureOut">
               <a:rPr lang="it-IT" smtClean="0"/>
               <a:pPr/>
-              <a:t>21/01/2023</a:t>
+              <a:t>27/01/2023</a:t>
             </a:fld>
             <a:endParaRPr lang="it-IT"/>
           </a:p>
@@ -4669,7 +4930,7 @@
             <a:fld id="{AD8BF249-6BAC-CD40-AAE9-334F110649E5}" type="datetimeFigureOut">
               <a:rPr lang="it-IT" smtClean="0"/>
               <a:pPr/>
-              <a:t>21/01/2023</a:t>
+              <a:t>27/01/2023</a:t>
             </a:fld>
             <a:endParaRPr lang="it-IT"/>
           </a:p>
@@ -9499,6 +9760,954 @@
 </p:sld>
 </file>
 
+<file path=ppt/slides/slide18.xml><?xml version="1.0" encoding="utf-8"?>
+<p:sld xmlns:a="http://schemas.openxmlformats.org/drawingml/2006/main" xmlns:r="http://schemas.openxmlformats.org/officeDocument/2006/relationships" xmlns:p="http://schemas.openxmlformats.org/presentationml/2006/main">
+  <p:cSld>
+    <p:spTree>
+      <p:nvGrpSpPr>
+        <p:cNvPr id="1" name=""/>
+        <p:cNvGrpSpPr/>
+        <p:nvPr/>
+      </p:nvGrpSpPr>
+      <p:grpSpPr>
+        <a:xfrm>
+          <a:off x="0" y="0"/>
+          <a:ext cx="0" cy="0"/>
+          <a:chOff x="0" y="0"/>
+          <a:chExt cx="0" cy="0"/>
+        </a:xfrm>
+      </p:grpSpPr>
+      <p:pic>
+        <p:nvPicPr>
+          <p:cNvPr id="2" name="Immagine 1"/>
+          <p:cNvPicPr>
+            <a:picLocks noChangeAspect="1"/>
+          </p:cNvPicPr>
+          <p:nvPr/>
+        </p:nvPicPr>
+        <p:blipFill>
+          <a:blip r:embed="rId3"/>
+          <a:stretch>
+            <a:fillRect/>
+          </a:stretch>
+        </p:blipFill>
+        <p:spPr>
+          <a:xfrm>
+            <a:off x="0" y="1707"/>
+            <a:ext cx="9180512" cy="6872633"/>
+          </a:xfrm>
+          <a:prstGeom prst="rect">
+            <a:avLst/>
+          </a:prstGeom>
+        </p:spPr>
+      </p:pic>
+      <p:sp>
+        <p:nvSpPr>
+          <p:cNvPr id="7" name="CasellaDiTesto 6"/>
+          <p:cNvSpPr txBox="1"/>
+          <p:nvPr/>
+        </p:nvSpPr>
+        <p:spPr>
+          <a:xfrm>
+            <a:off x="648253" y="1305402"/>
+            <a:ext cx="5196702" cy="461665"/>
+          </a:xfrm>
+          <a:prstGeom prst="rect">
+            <a:avLst/>
+          </a:prstGeom>
+          <a:noFill/>
+        </p:spPr>
+        <p:txBody>
+          <a:bodyPr wrap="square" rtlCol="0">
+            <a:spAutoFit/>
+          </a:bodyPr>
+          <a:lstStyle/>
+          <a:p>
+            <a:r>
+              <a:rPr lang="it-IT" sz="2400" b="1" dirty="0" err="1">
+                <a:solidFill>
+                  <a:schemeClr val="accent1">
+                    <a:lumMod val="75000"/>
+                  </a:schemeClr>
+                </a:solidFill>
+                <a:latin typeface="Arial"/>
+                <a:cs typeface="Arial"/>
+              </a:rPr>
+              <a:t>Parallelization</a:t>
+            </a:r>
+            <a:r>
+              <a:rPr lang="it-IT" sz="2400" b="1" dirty="0">
+                <a:solidFill>
+                  <a:schemeClr val="accent1">
+                    <a:lumMod val="75000"/>
+                  </a:schemeClr>
+                </a:solidFill>
+                <a:latin typeface="Arial"/>
+                <a:cs typeface="Arial"/>
+              </a:rPr>
+              <a:t> with </a:t>
+            </a:r>
+            <a:r>
+              <a:rPr lang="it-IT" sz="2400" b="1" dirty="0" err="1">
+                <a:solidFill>
+                  <a:schemeClr val="accent1">
+                    <a:lumMod val="75000"/>
+                  </a:schemeClr>
+                </a:solidFill>
+                <a:latin typeface="Arial"/>
+                <a:cs typeface="Arial"/>
+              </a:rPr>
+              <a:t>Joblib</a:t>
+            </a:r>
+            <a:endParaRPr lang="it-IT" sz="2400" b="1" dirty="0">
+              <a:solidFill>
+                <a:schemeClr val="accent1">
+                  <a:lumMod val="75000"/>
+                </a:schemeClr>
+              </a:solidFill>
+              <a:latin typeface="Arial"/>
+              <a:cs typeface="Arial"/>
+            </a:endParaRPr>
+          </a:p>
+        </p:txBody>
+      </p:sp>
+      <p:sp>
+        <p:nvSpPr>
+          <p:cNvPr id="8" name="CasellaDiTesto 7"/>
+          <p:cNvSpPr txBox="1"/>
+          <p:nvPr/>
+        </p:nvSpPr>
+        <p:spPr>
+          <a:xfrm>
+            <a:off x="648253" y="1705113"/>
+            <a:ext cx="736099" cy="369332"/>
+          </a:xfrm>
+          <a:prstGeom prst="rect">
+            <a:avLst/>
+          </a:prstGeom>
+          <a:noFill/>
+        </p:spPr>
+        <p:txBody>
+          <a:bodyPr wrap="none" rtlCol="0">
+            <a:spAutoFit/>
+          </a:bodyPr>
+          <a:lstStyle/>
+          <a:p>
+            <a:r>
+              <a:rPr lang="it-IT" dirty="0">
+                <a:latin typeface="Arial"/>
+                <a:cs typeface="Arial"/>
+              </a:rPr>
+              <a:t>Code</a:t>
+            </a:r>
+          </a:p>
+        </p:txBody>
+      </p:sp>
+      <p:sp>
+        <p:nvSpPr>
+          <p:cNvPr id="12" name="Rettangolo 11"/>
+          <p:cNvSpPr/>
+          <p:nvPr/>
+        </p:nvSpPr>
+        <p:spPr>
+          <a:xfrm>
+            <a:off x="8255000" y="6366466"/>
+            <a:ext cx="280763" cy="501650"/>
+          </a:xfrm>
+          <a:prstGeom prst="rect">
+            <a:avLst/>
+          </a:prstGeom>
+          <a:solidFill>
+            <a:srgbClr val="003053"/>
+          </a:solidFill>
+        </p:spPr>
+        <p:style>
+          <a:lnRef idx="1">
+            <a:schemeClr val="accent1"/>
+          </a:lnRef>
+          <a:fillRef idx="3">
+            <a:schemeClr val="accent1"/>
+          </a:fillRef>
+          <a:effectRef idx="2">
+            <a:schemeClr val="accent1"/>
+          </a:effectRef>
+          <a:fontRef idx="minor">
+            <a:schemeClr val="lt1"/>
+          </a:fontRef>
+        </p:style>
+        <p:txBody>
+          <a:bodyPr rtlCol="0" anchor="ctr"/>
+          <a:lstStyle/>
+          <a:p>
+            <a:pPr algn="ctr"/>
+            <a:endParaRPr lang="it-IT">
+              <a:solidFill>
+                <a:srgbClr val="003257"/>
+              </a:solidFill>
+            </a:endParaRPr>
+          </a:p>
+        </p:txBody>
+      </p:sp>
+      <p:sp>
+        <p:nvSpPr>
+          <p:cNvPr id="11" name="Segnaposto numero diapositiva 10"/>
+          <p:cNvSpPr>
+            <a:spLocks noGrp="1"/>
+          </p:cNvSpPr>
+          <p:nvPr>
+            <p:ph type="sldNum" sz="quarter" idx="12"/>
+          </p:nvPr>
+        </p:nvSpPr>
+        <p:spPr>
+          <a:xfrm>
+            <a:off x="6402163" y="6356350"/>
+            <a:ext cx="2133600" cy="365125"/>
+          </a:xfrm>
+        </p:spPr>
+        <p:txBody>
+          <a:bodyPr/>
+          <a:lstStyle/>
+          <a:p>
+            <a:fld id="{8EB8520A-26EA-DE4B-B141-4532FC98FF0E}" type="slidenum">
+              <a:rPr lang="it-IT" b="1" smtClean="0">
+                <a:solidFill>
+                  <a:schemeClr val="bg1"/>
+                </a:solidFill>
+                <a:latin typeface="Arial"/>
+                <a:cs typeface="Arial"/>
+              </a:rPr>
+              <a:pPr/>
+              <a:t>18</a:t>
+            </a:fld>
+            <a:endParaRPr lang="it-IT" b="1" dirty="0">
+              <a:solidFill>
+                <a:schemeClr val="bg1"/>
+              </a:solidFill>
+              <a:latin typeface="Arial"/>
+              <a:cs typeface="Arial"/>
+            </a:endParaRPr>
+          </a:p>
+        </p:txBody>
+      </p:sp>
+      <p:sp>
+        <p:nvSpPr>
+          <p:cNvPr id="10" name="CasellaDiTesto 9"/>
+          <p:cNvSpPr txBox="1"/>
+          <p:nvPr/>
+        </p:nvSpPr>
+        <p:spPr>
+          <a:xfrm>
+            <a:off x="5844956" y="51433"/>
+            <a:ext cx="2848857" cy="338554"/>
+          </a:xfrm>
+          <a:prstGeom prst="rect">
+            <a:avLst/>
+          </a:prstGeom>
+          <a:noFill/>
+        </p:spPr>
+        <p:txBody>
+          <a:bodyPr wrap="none" rtlCol="0">
+            <a:spAutoFit/>
+          </a:bodyPr>
+          <a:lstStyle/>
+          <a:p>
+            <a:pPr algn="r"/>
+            <a:r>
+              <a:rPr lang="it-IT" sz="800" b="1" dirty="0">
+                <a:solidFill>
+                  <a:schemeClr val="bg1"/>
+                </a:solidFill>
+                <a:latin typeface="Arial"/>
+                <a:cs typeface="Arial"/>
+              </a:rPr>
+              <a:t>Local </a:t>
+            </a:r>
+            <a:r>
+              <a:rPr lang="it-IT" sz="800" b="1" dirty="0" err="1">
+                <a:solidFill>
+                  <a:schemeClr val="bg1"/>
+                </a:solidFill>
+                <a:latin typeface="Arial"/>
+                <a:cs typeface="Arial"/>
+              </a:rPr>
+              <a:t>Binary</a:t>
+            </a:r>
+            <a:r>
+              <a:rPr lang="it-IT" sz="800" b="1" dirty="0">
+                <a:solidFill>
+                  <a:schemeClr val="bg1"/>
+                </a:solidFill>
+                <a:latin typeface="Arial"/>
+                <a:cs typeface="Arial"/>
+              </a:rPr>
+              <a:t> Pattern</a:t>
+            </a:r>
+          </a:p>
+          <a:p>
+            <a:pPr algn="r"/>
+            <a:r>
+              <a:rPr lang="it-IT" sz="800" b="1" dirty="0" err="1">
+                <a:solidFill>
+                  <a:schemeClr val="bg1"/>
+                </a:solidFill>
+                <a:latin typeface="Arial"/>
+                <a:cs typeface="Arial"/>
+              </a:rPr>
+              <a:t>Comparison</a:t>
+            </a:r>
+            <a:r>
+              <a:rPr lang="it-IT" sz="800" b="1" dirty="0">
+                <a:solidFill>
+                  <a:schemeClr val="bg1"/>
+                </a:solidFill>
+                <a:latin typeface="Arial"/>
+                <a:cs typeface="Arial"/>
+              </a:rPr>
+              <a:t> </a:t>
+            </a:r>
+            <a:r>
+              <a:rPr lang="it-IT" sz="800" b="1" dirty="0" err="1">
+                <a:solidFill>
+                  <a:schemeClr val="bg1"/>
+                </a:solidFill>
+                <a:latin typeface="Arial"/>
+                <a:cs typeface="Arial"/>
+              </a:rPr>
+              <a:t>between</a:t>
+            </a:r>
+            <a:r>
+              <a:rPr lang="it-IT" sz="800" b="1" dirty="0">
+                <a:solidFill>
+                  <a:schemeClr val="bg1"/>
+                </a:solidFill>
+                <a:latin typeface="Arial"/>
+                <a:cs typeface="Arial"/>
+              </a:rPr>
+              <a:t> a </a:t>
+            </a:r>
+            <a:r>
+              <a:rPr lang="it-IT" sz="800" b="1" dirty="0" err="1">
+                <a:solidFill>
+                  <a:schemeClr val="bg1"/>
+                </a:solidFill>
+                <a:latin typeface="Arial"/>
+                <a:cs typeface="Arial"/>
+              </a:rPr>
+              <a:t>sequential</a:t>
+            </a:r>
+            <a:r>
+              <a:rPr lang="it-IT" sz="800" b="1" dirty="0">
+                <a:solidFill>
+                  <a:schemeClr val="bg1"/>
+                </a:solidFill>
+                <a:latin typeface="Arial"/>
+                <a:cs typeface="Arial"/>
+              </a:rPr>
+              <a:t> and </a:t>
+            </a:r>
+            <a:r>
+              <a:rPr lang="it-IT" sz="800" b="1" dirty="0" err="1">
+                <a:solidFill>
+                  <a:schemeClr val="bg1"/>
+                </a:solidFill>
+                <a:latin typeface="Arial"/>
+                <a:cs typeface="Arial"/>
+              </a:rPr>
+              <a:t>parallel</a:t>
+            </a:r>
+            <a:r>
+              <a:rPr lang="it-IT" sz="800" b="1" dirty="0">
+                <a:solidFill>
+                  <a:schemeClr val="bg1"/>
+                </a:solidFill>
+                <a:latin typeface="Arial"/>
+                <a:cs typeface="Arial"/>
+              </a:rPr>
+              <a:t> </a:t>
+            </a:r>
+            <a:r>
+              <a:rPr lang="it-IT" sz="800" b="1" dirty="0" err="1">
+                <a:solidFill>
+                  <a:schemeClr val="bg1"/>
+                </a:solidFill>
+                <a:latin typeface="Arial"/>
+                <a:cs typeface="Arial"/>
+              </a:rPr>
+              <a:t>version</a:t>
+            </a:r>
+            <a:endParaRPr lang="it-IT" sz="800" b="1" dirty="0">
+              <a:solidFill>
+                <a:schemeClr val="bg1"/>
+              </a:solidFill>
+              <a:latin typeface="Arial"/>
+              <a:cs typeface="Arial"/>
+            </a:endParaRPr>
+          </a:p>
+        </p:txBody>
+      </p:sp>
+      <p:sp>
+        <p:nvSpPr>
+          <p:cNvPr id="14" name="CasellaDiTesto 13"/>
+          <p:cNvSpPr txBox="1"/>
+          <p:nvPr/>
+        </p:nvSpPr>
+        <p:spPr>
+          <a:xfrm>
+            <a:off x="7082015" y="403482"/>
+            <a:ext cx="1621846" cy="492443"/>
+          </a:xfrm>
+          <a:prstGeom prst="rect">
+            <a:avLst/>
+          </a:prstGeom>
+          <a:noFill/>
+        </p:spPr>
+        <p:txBody>
+          <a:bodyPr wrap="none" rtlCol="0">
+            <a:spAutoFit/>
+          </a:bodyPr>
+          <a:lstStyle/>
+          <a:p>
+            <a:pPr algn="r"/>
+            <a:r>
+              <a:rPr lang="it-IT" sz="800" dirty="0">
+                <a:solidFill>
+                  <a:schemeClr val="bg1"/>
+                </a:solidFill>
+                <a:latin typeface="Arial"/>
+                <a:cs typeface="Arial"/>
+              </a:rPr>
+              <a:t>Firenze – 2/2/2023</a:t>
+            </a:r>
+          </a:p>
+          <a:p>
+            <a:endParaRPr lang="it-IT" dirty="0"/>
+          </a:p>
+        </p:txBody>
+      </p:sp>
+      <p:pic>
+        <p:nvPicPr>
+          <p:cNvPr id="5" name="Immagine 4">
+            <a:extLst>
+              <a:ext uri="{FF2B5EF4-FFF2-40B4-BE49-F238E27FC236}">
+                <a16:creationId xmlns:a16="http://schemas.microsoft.com/office/drawing/2014/main" id="{B70BE023-7801-1EBA-F422-C8CD93F227BE}"/>
+              </a:ext>
+            </a:extLst>
+          </p:cNvPr>
+          <p:cNvPicPr>
+            <a:picLocks noChangeAspect="1"/>
+          </p:cNvPicPr>
+          <p:nvPr/>
+        </p:nvPicPr>
+        <p:blipFill>
+          <a:blip r:embed="rId4"/>
+          <a:stretch>
+            <a:fillRect/>
+          </a:stretch>
+        </p:blipFill>
+        <p:spPr>
+          <a:xfrm>
+            <a:off x="648253" y="2177378"/>
+            <a:ext cx="7931558" cy="4026107"/>
+          </a:xfrm>
+          <a:prstGeom prst="rect">
+            <a:avLst/>
+          </a:prstGeom>
+        </p:spPr>
+      </p:pic>
+    </p:spTree>
+    <p:extLst>
+      <p:ext uri="{BB962C8B-B14F-4D97-AF65-F5344CB8AC3E}">
+        <p14:creationId xmlns:p14="http://schemas.microsoft.com/office/powerpoint/2010/main" val="1439433907"/>
+      </p:ext>
+    </p:extLst>
+  </p:cSld>
+  <p:clrMapOvr>
+    <a:masterClrMapping/>
+  </p:clrMapOvr>
+</p:sld>
+</file>
+
+<file path=ppt/slides/slide19.xml><?xml version="1.0" encoding="utf-8"?>
+<p:sld xmlns:a="http://schemas.openxmlformats.org/drawingml/2006/main" xmlns:r="http://schemas.openxmlformats.org/officeDocument/2006/relationships" xmlns:p="http://schemas.openxmlformats.org/presentationml/2006/main">
+  <p:cSld>
+    <p:spTree>
+      <p:nvGrpSpPr>
+        <p:cNvPr id="1" name=""/>
+        <p:cNvGrpSpPr/>
+        <p:nvPr/>
+      </p:nvGrpSpPr>
+      <p:grpSpPr>
+        <a:xfrm>
+          <a:off x="0" y="0"/>
+          <a:ext cx="0" cy="0"/>
+          <a:chOff x="0" y="0"/>
+          <a:chExt cx="0" cy="0"/>
+        </a:xfrm>
+      </p:grpSpPr>
+      <p:pic>
+        <p:nvPicPr>
+          <p:cNvPr id="2" name="Immagine 1"/>
+          <p:cNvPicPr>
+            <a:picLocks noChangeAspect="1"/>
+          </p:cNvPicPr>
+          <p:nvPr/>
+        </p:nvPicPr>
+        <p:blipFill>
+          <a:blip r:embed="rId3"/>
+          <a:stretch>
+            <a:fillRect/>
+          </a:stretch>
+        </p:blipFill>
+        <p:spPr>
+          <a:xfrm>
+            <a:off x="0" y="1707"/>
+            <a:ext cx="9180512" cy="6872633"/>
+          </a:xfrm>
+          <a:prstGeom prst="rect">
+            <a:avLst/>
+          </a:prstGeom>
+        </p:spPr>
+      </p:pic>
+      <p:sp>
+        <p:nvSpPr>
+          <p:cNvPr id="7" name="CasellaDiTesto 6"/>
+          <p:cNvSpPr txBox="1"/>
+          <p:nvPr/>
+        </p:nvSpPr>
+        <p:spPr>
+          <a:xfrm>
+            <a:off x="648253" y="1305402"/>
+            <a:ext cx="5196702" cy="461665"/>
+          </a:xfrm>
+          <a:prstGeom prst="rect">
+            <a:avLst/>
+          </a:prstGeom>
+          <a:noFill/>
+        </p:spPr>
+        <p:txBody>
+          <a:bodyPr wrap="square" rtlCol="0">
+            <a:spAutoFit/>
+          </a:bodyPr>
+          <a:lstStyle/>
+          <a:p>
+            <a:r>
+              <a:rPr lang="it-IT" sz="2400" b="1" dirty="0" err="1">
+                <a:solidFill>
+                  <a:schemeClr val="accent1">
+                    <a:lumMod val="75000"/>
+                  </a:schemeClr>
+                </a:solidFill>
+                <a:latin typeface="Arial"/>
+                <a:cs typeface="Arial"/>
+              </a:rPr>
+              <a:t>Speedup</a:t>
+            </a:r>
+            <a:r>
+              <a:rPr lang="it-IT" sz="2400" b="1" dirty="0">
+                <a:solidFill>
+                  <a:schemeClr val="accent1">
+                    <a:lumMod val="75000"/>
+                  </a:schemeClr>
+                </a:solidFill>
+                <a:latin typeface="Arial"/>
+                <a:cs typeface="Arial"/>
+              </a:rPr>
+              <a:t> Analysis</a:t>
+            </a:r>
+          </a:p>
+        </p:txBody>
+      </p:sp>
+      <p:sp>
+        <p:nvSpPr>
+          <p:cNvPr id="8" name="CasellaDiTesto 7"/>
+          <p:cNvSpPr txBox="1"/>
+          <p:nvPr/>
+        </p:nvSpPr>
+        <p:spPr>
+          <a:xfrm>
+            <a:off x="648253" y="1705113"/>
+            <a:ext cx="4155946" cy="369332"/>
+          </a:xfrm>
+          <a:prstGeom prst="rect">
+            <a:avLst/>
+          </a:prstGeom>
+          <a:noFill/>
+        </p:spPr>
+        <p:txBody>
+          <a:bodyPr wrap="none" rtlCol="0">
+            <a:spAutoFit/>
+          </a:bodyPr>
+          <a:lstStyle/>
+          <a:p>
+            <a:r>
+              <a:rPr lang="it-IT" dirty="0" err="1">
+                <a:latin typeface="Arial"/>
+                <a:cs typeface="Arial"/>
+              </a:rPr>
+              <a:t>Speedup</a:t>
+            </a:r>
+            <a:r>
+              <a:rPr lang="it-IT" dirty="0">
+                <a:latin typeface="Arial"/>
+                <a:cs typeface="Arial"/>
+              </a:rPr>
+              <a:t> </a:t>
+            </a:r>
+            <a:r>
+              <a:rPr lang="it-IT" dirty="0" err="1">
+                <a:latin typeface="Arial"/>
+                <a:cs typeface="Arial"/>
+              </a:rPr>
+              <a:t>results</a:t>
+            </a:r>
+            <a:r>
+              <a:rPr lang="it-IT" dirty="0">
+                <a:latin typeface="Arial"/>
+                <a:cs typeface="Arial"/>
+              </a:rPr>
+              <a:t> with </a:t>
+            </a:r>
+            <a:r>
+              <a:rPr lang="it-IT" dirty="0" err="1">
+                <a:latin typeface="Arial"/>
+                <a:cs typeface="Arial"/>
+              </a:rPr>
+              <a:t>different</a:t>
+            </a:r>
+            <a:r>
+              <a:rPr lang="it-IT" dirty="0">
+                <a:latin typeface="Arial"/>
+                <a:cs typeface="Arial"/>
+              </a:rPr>
+              <a:t> datasets</a:t>
+            </a:r>
+          </a:p>
+        </p:txBody>
+      </p:sp>
+      <p:sp>
+        <p:nvSpPr>
+          <p:cNvPr id="12" name="Rettangolo 11"/>
+          <p:cNvSpPr/>
+          <p:nvPr/>
+        </p:nvSpPr>
+        <p:spPr>
+          <a:xfrm>
+            <a:off x="8255000" y="6366466"/>
+            <a:ext cx="280763" cy="501650"/>
+          </a:xfrm>
+          <a:prstGeom prst="rect">
+            <a:avLst/>
+          </a:prstGeom>
+          <a:solidFill>
+            <a:srgbClr val="003053"/>
+          </a:solidFill>
+        </p:spPr>
+        <p:style>
+          <a:lnRef idx="1">
+            <a:schemeClr val="accent1"/>
+          </a:lnRef>
+          <a:fillRef idx="3">
+            <a:schemeClr val="accent1"/>
+          </a:fillRef>
+          <a:effectRef idx="2">
+            <a:schemeClr val="accent1"/>
+          </a:effectRef>
+          <a:fontRef idx="minor">
+            <a:schemeClr val="lt1"/>
+          </a:fontRef>
+        </p:style>
+        <p:txBody>
+          <a:bodyPr rtlCol="0" anchor="ctr"/>
+          <a:lstStyle/>
+          <a:p>
+            <a:pPr algn="ctr"/>
+            <a:endParaRPr lang="it-IT">
+              <a:solidFill>
+                <a:srgbClr val="003257"/>
+              </a:solidFill>
+            </a:endParaRPr>
+          </a:p>
+        </p:txBody>
+      </p:sp>
+      <p:sp>
+        <p:nvSpPr>
+          <p:cNvPr id="11" name="Segnaposto numero diapositiva 10"/>
+          <p:cNvSpPr>
+            <a:spLocks noGrp="1"/>
+          </p:cNvSpPr>
+          <p:nvPr>
+            <p:ph type="sldNum" sz="quarter" idx="12"/>
+          </p:nvPr>
+        </p:nvSpPr>
+        <p:spPr>
+          <a:xfrm>
+            <a:off x="6402163" y="6356350"/>
+            <a:ext cx="2133600" cy="365125"/>
+          </a:xfrm>
+        </p:spPr>
+        <p:txBody>
+          <a:bodyPr/>
+          <a:lstStyle/>
+          <a:p>
+            <a:fld id="{8EB8520A-26EA-DE4B-B141-4532FC98FF0E}" type="slidenum">
+              <a:rPr lang="it-IT" b="1" smtClean="0">
+                <a:solidFill>
+                  <a:schemeClr val="bg1"/>
+                </a:solidFill>
+                <a:latin typeface="Arial"/>
+                <a:cs typeface="Arial"/>
+              </a:rPr>
+              <a:pPr/>
+              <a:t>19</a:t>
+            </a:fld>
+            <a:endParaRPr lang="it-IT" b="1" dirty="0">
+              <a:solidFill>
+                <a:schemeClr val="bg1"/>
+              </a:solidFill>
+              <a:latin typeface="Arial"/>
+              <a:cs typeface="Arial"/>
+            </a:endParaRPr>
+          </a:p>
+        </p:txBody>
+      </p:sp>
+      <p:sp>
+        <p:nvSpPr>
+          <p:cNvPr id="10" name="CasellaDiTesto 9"/>
+          <p:cNvSpPr txBox="1"/>
+          <p:nvPr/>
+        </p:nvSpPr>
+        <p:spPr>
+          <a:xfrm>
+            <a:off x="5844956" y="51433"/>
+            <a:ext cx="2848857" cy="338554"/>
+          </a:xfrm>
+          <a:prstGeom prst="rect">
+            <a:avLst/>
+          </a:prstGeom>
+          <a:noFill/>
+        </p:spPr>
+        <p:txBody>
+          <a:bodyPr wrap="none" rtlCol="0">
+            <a:spAutoFit/>
+          </a:bodyPr>
+          <a:lstStyle/>
+          <a:p>
+            <a:pPr algn="r"/>
+            <a:r>
+              <a:rPr lang="it-IT" sz="800" b="1" dirty="0">
+                <a:solidFill>
+                  <a:schemeClr val="bg1"/>
+                </a:solidFill>
+                <a:latin typeface="Arial"/>
+                <a:cs typeface="Arial"/>
+              </a:rPr>
+              <a:t>Local </a:t>
+            </a:r>
+            <a:r>
+              <a:rPr lang="it-IT" sz="800" b="1" dirty="0" err="1">
+                <a:solidFill>
+                  <a:schemeClr val="bg1"/>
+                </a:solidFill>
+                <a:latin typeface="Arial"/>
+                <a:cs typeface="Arial"/>
+              </a:rPr>
+              <a:t>Binary</a:t>
+            </a:r>
+            <a:r>
+              <a:rPr lang="it-IT" sz="800" b="1" dirty="0">
+                <a:solidFill>
+                  <a:schemeClr val="bg1"/>
+                </a:solidFill>
+                <a:latin typeface="Arial"/>
+                <a:cs typeface="Arial"/>
+              </a:rPr>
+              <a:t> Pattern</a:t>
+            </a:r>
+          </a:p>
+          <a:p>
+            <a:pPr algn="r"/>
+            <a:r>
+              <a:rPr lang="it-IT" sz="800" b="1" dirty="0" err="1">
+                <a:solidFill>
+                  <a:schemeClr val="bg1"/>
+                </a:solidFill>
+                <a:latin typeface="Arial"/>
+                <a:cs typeface="Arial"/>
+              </a:rPr>
+              <a:t>Comparison</a:t>
+            </a:r>
+            <a:r>
+              <a:rPr lang="it-IT" sz="800" b="1" dirty="0">
+                <a:solidFill>
+                  <a:schemeClr val="bg1"/>
+                </a:solidFill>
+                <a:latin typeface="Arial"/>
+                <a:cs typeface="Arial"/>
+              </a:rPr>
+              <a:t> </a:t>
+            </a:r>
+            <a:r>
+              <a:rPr lang="it-IT" sz="800" b="1" dirty="0" err="1">
+                <a:solidFill>
+                  <a:schemeClr val="bg1"/>
+                </a:solidFill>
+                <a:latin typeface="Arial"/>
+                <a:cs typeface="Arial"/>
+              </a:rPr>
+              <a:t>between</a:t>
+            </a:r>
+            <a:r>
+              <a:rPr lang="it-IT" sz="800" b="1" dirty="0">
+                <a:solidFill>
+                  <a:schemeClr val="bg1"/>
+                </a:solidFill>
+                <a:latin typeface="Arial"/>
+                <a:cs typeface="Arial"/>
+              </a:rPr>
+              <a:t> a </a:t>
+            </a:r>
+            <a:r>
+              <a:rPr lang="it-IT" sz="800" b="1" dirty="0" err="1">
+                <a:solidFill>
+                  <a:schemeClr val="bg1"/>
+                </a:solidFill>
+                <a:latin typeface="Arial"/>
+                <a:cs typeface="Arial"/>
+              </a:rPr>
+              <a:t>sequential</a:t>
+            </a:r>
+            <a:r>
+              <a:rPr lang="it-IT" sz="800" b="1" dirty="0">
+                <a:solidFill>
+                  <a:schemeClr val="bg1"/>
+                </a:solidFill>
+                <a:latin typeface="Arial"/>
+                <a:cs typeface="Arial"/>
+              </a:rPr>
+              <a:t> and </a:t>
+            </a:r>
+            <a:r>
+              <a:rPr lang="it-IT" sz="800" b="1" dirty="0" err="1">
+                <a:solidFill>
+                  <a:schemeClr val="bg1"/>
+                </a:solidFill>
+                <a:latin typeface="Arial"/>
+                <a:cs typeface="Arial"/>
+              </a:rPr>
+              <a:t>parallel</a:t>
+            </a:r>
+            <a:r>
+              <a:rPr lang="it-IT" sz="800" b="1" dirty="0">
+                <a:solidFill>
+                  <a:schemeClr val="bg1"/>
+                </a:solidFill>
+                <a:latin typeface="Arial"/>
+                <a:cs typeface="Arial"/>
+              </a:rPr>
+              <a:t> </a:t>
+            </a:r>
+            <a:r>
+              <a:rPr lang="it-IT" sz="800" b="1" dirty="0" err="1">
+                <a:solidFill>
+                  <a:schemeClr val="bg1"/>
+                </a:solidFill>
+                <a:latin typeface="Arial"/>
+                <a:cs typeface="Arial"/>
+              </a:rPr>
+              <a:t>version</a:t>
+            </a:r>
+            <a:endParaRPr lang="it-IT" sz="800" b="1" dirty="0">
+              <a:solidFill>
+                <a:schemeClr val="bg1"/>
+              </a:solidFill>
+              <a:latin typeface="Arial"/>
+              <a:cs typeface="Arial"/>
+            </a:endParaRPr>
+          </a:p>
+        </p:txBody>
+      </p:sp>
+      <p:sp>
+        <p:nvSpPr>
+          <p:cNvPr id="14" name="CasellaDiTesto 13"/>
+          <p:cNvSpPr txBox="1"/>
+          <p:nvPr/>
+        </p:nvSpPr>
+        <p:spPr>
+          <a:xfrm>
+            <a:off x="7082015" y="403482"/>
+            <a:ext cx="1621846" cy="492443"/>
+          </a:xfrm>
+          <a:prstGeom prst="rect">
+            <a:avLst/>
+          </a:prstGeom>
+          <a:noFill/>
+        </p:spPr>
+        <p:txBody>
+          <a:bodyPr wrap="none" rtlCol="0">
+            <a:spAutoFit/>
+          </a:bodyPr>
+          <a:lstStyle/>
+          <a:p>
+            <a:pPr algn="r"/>
+            <a:r>
+              <a:rPr lang="it-IT" sz="800" dirty="0">
+                <a:solidFill>
+                  <a:schemeClr val="bg1"/>
+                </a:solidFill>
+                <a:latin typeface="Arial"/>
+                <a:cs typeface="Arial"/>
+              </a:rPr>
+              <a:t>Firenze – 2/2/2023</a:t>
+            </a:r>
+          </a:p>
+          <a:p>
+            <a:endParaRPr lang="it-IT" dirty="0"/>
+          </a:p>
+        </p:txBody>
+      </p:sp>
+      <p:pic>
+        <p:nvPicPr>
+          <p:cNvPr id="9" name="Immagine 8">
+            <a:extLst>
+              <a:ext uri="{FF2B5EF4-FFF2-40B4-BE49-F238E27FC236}">
+                <a16:creationId xmlns:a16="http://schemas.microsoft.com/office/drawing/2014/main" id="{88CC26A3-E3E8-3FBB-AD25-ACE90811F6C7}"/>
+              </a:ext>
+            </a:extLst>
+          </p:cNvPr>
+          <p:cNvPicPr>
+            <a:picLocks noChangeAspect="1"/>
+          </p:cNvPicPr>
+          <p:nvPr/>
+        </p:nvPicPr>
+        <p:blipFill>
+          <a:blip r:embed="rId4"/>
+          <a:stretch>
+            <a:fillRect/>
+          </a:stretch>
+        </p:blipFill>
+        <p:spPr>
+          <a:xfrm>
+            <a:off x="2315949" y="2429265"/>
+            <a:ext cx="4512102" cy="3774220"/>
+          </a:xfrm>
+          <a:prstGeom prst="rect">
+            <a:avLst/>
+          </a:prstGeom>
+        </p:spPr>
+      </p:pic>
+    </p:spTree>
+    <p:extLst>
+      <p:ext uri="{BB962C8B-B14F-4D97-AF65-F5344CB8AC3E}">
+        <p14:creationId xmlns:p14="http://schemas.microsoft.com/office/powerpoint/2010/main" val="131281501"/>
+      </p:ext>
+    </p:extLst>
+  </p:cSld>
+  <p:clrMapOvr>
+    <a:masterClrMapping/>
+  </p:clrMapOvr>
+</p:sld>
+</file>
+
 <file path=ppt/slides/slide2.xml><?xml version="1.0" encoding="utf-8"?>
 <p:sld xmlns:a="http://schemas.openxmlformats.org/drawingml/2006/main" xmlns:r="http://schemas.openxmlformats.org/officeDocument/2006/relationships" xmlns:p="http://schemas.openxmlformats.org/presentationml/2006/main">
   <p:cSld>
@@ -9984,6 +11193,549 @@
     <p:extLst>
       <p:ext uri="{BB962C8B-B14F-4D97-AF65-F5344CB8AC3E}">
         <p14:creationId xmlns:p14="http://schemas.microsoft.com/office/powerpoint/2010/main" val="3016431194"/>
+      </p:ext>
+    </p:extLst>
+  </p:cSld>
+  <p:clrMapOvr>
+    <a:masterClrMapping/>
+  </p:clrMapOvr>
+</p:sld>
+</file>
+
+<file path=ppt/slides/slide20.xml><?xml version="1.0" encoding="utf-8"?>
+<p:sld xmlns:a="http://schemas.openxmlformats.org/drawingml/2006/main" xmlns:r="http://schemas.openxmlformats.org/officeDocument/2006/relationships" xmlns:p="http://schemas.openxmlformats.org/presentationml/2006/main">
+  <p:cSld>
+    <p:spTree>
+      <p:nvGrpSpPr>
+        <p:cNvPr id="1" name=""/>
+        <p:cNvGrpSpPr/>
+        <p:nvPr/>
+      </p:nvGrpSpPr>
+      <p:grpSpPr>
+        <a:xfrm>
+          <a:off x="0" y="0"/>
+          <a:ext cx="0" cy="0"/>
+          <a:chOff x="0" y="0"/>
+          <a:chExt cx="0" cy="0"/>
+        </a:xfrm>
+      </p:grpSpPr>
+      <p:pic>
+        <p:nvPicPr>
+          <p:cNvPr id="2" name="Immagine 1"/>
+          <p:cNvPicPr>
+            <a:picLocks noChangeAspect="1"/>
+          </p:cNvPicPr>
+          <p:nvPr/>
+        </p:nvPicPr>
+        <p:blipFill>
+          <a:blip r:embed="rId3"/>
+          <a:stretch>
+            <a:fillRect/>
+          </a:stretch>
+        </p:blipFill>
+        <p:spPr>
+          <a:xfrm>
+            <a:off x="0" y="1707"/>
+            <a:ext cx="9180512" cy="6872633"/>
+          </a:xfrm>
+          <a:prstGeom prst="rect">
+            <a:avLst/>
+          </a:prstGeom>
+        </p:spPr>
+      </p:pic>
+      <p:sp>
+        <p:nvSpPr>
+          <p:cNvPr id="7" name="CasellaDiTesto 6"/>
+          <p:cNvSpPr txBox="1"/>
+          <p:nvPr/>
+        </p:nvSpPr>
+        <p:spPr>
+          <a:xfrm>
+            <a:off x="648253" y="1305402"/>
+            <a:ext cx="5196702" cy="461665"/>
+          </a:xfrm>
+          <a:prstGeom prst="rect">
+            <a:avLst/>
+          </a:prstGeom>
+          <a:noFill/>
+        </p:spPr>
+        <p:txBody>
+          <a:bodyPr wrap="square" rtlCol="0">
+            <a:spAutoFit/>
+          </a:bodyPr>
+          <a:lstStyle/>
+          <a:p>
+            <a:r>
+              <a:rPr lang="it-IT" sz="2400" b="1" dirty="0" err="1">
+                <a:solidFill>
+                  <a:schemeClr val="accent1">
+                    <a:lumMod val="75000"/>
+                  </a:schemeClr>
+                </a:solidFill>
+                <a:latin typeface="Arial"/>
+                <a:cs typeface="Arial"/>
+              </a:rPr>
+              <a:t>Speedup</a:t>
+            </a:r>
+            <a:r>
+              <a:rPr lang="it-IT" sz="2400" b="1" dirty="0">
+                <a:solidFill>
+                  <a:schemeClr val="accent1">
+                    <a:lumMod val="75000"/>
+                  </a:schemeClr>
+                </a:solidFill>
+                <a:latin typeface="Arial"/>
+                <a:cs typeface="Arial"/>
+              </a:rPr>
+              <a:t> Analysis</a:t>
+            </a:r>
+          </a:p>
+        </p:txBody>
+      </p:sp>
+      <p:sp>
+        <p:nvSpPr>
+          <p:cNvPr id="8" name="CasellaDiTesto 7"/>
+          <p:cNvSpPr txBox="1"/>
+          <p:nvPr/>
+        </p:nvSpPr>
+        <p:spPr>
+          <a:xfrm>
+            <a:off x="648253" y="1705113"/>
+            <a:ext cx="1877502" cy="369332"/>
+          </a:xfrm>
+          <a:prstGeom prst="rect">
+            <a:avLst/>
+          </a:prstGeom>
+          <a:noFill/>
+        </p:spPr>
+        <p:txBody>
+          <a:bodyPr wrap="none" rtlCol="0">
+            <a:spAutoFit/>
+          </a:bodyPr>
+          <a:lstStyle/>
+          <a:p>
+            <a:r>
+              <a:rPr lang="it-IT" dirty="0" err="1">
+                <a:latin typeface="Arial"/>
+                <a:cs typeface="Arial"/>
+              </a:rPr>
+              <a:t>Execution</a:t>
+            </a:r>
+            <a:r>
+              <a:rPr lang="it-IT" dirty="0">
+                <a:latin typeface="Arial"/>
+                <a:cs typeface="Arial"/>
+              </a:rPr>
+              <a:t> Times</a:t>
+            </a:r>
+          </a:p>
+        </p:txBody>
+      </p:sp>
+      <p:sp>
+        <p:nvSpPr>
+          <p:cNvPr id="12" name="Rettangolo 11"/>
+          <p:cNvSpPr/>
+          <p:nvPr/>
+        </p:nvSpPr>
+        <p:spPr>
+          <a:xfrm>
+            <a:off x="8255000" y="6366466"/>
+            <a:ext cx="280763" cy="501650"/>
+          </a:xfrm>
+          <a:prstGeom prst="rect">
+            <a:avLst/>
+          </a:prstGeom>
+          <a:solidFill>
+            <a:srgbClr val="003053"/>
+          </a:solidFill>
+        </p:spPr>
+        <p:style>
+          <a:lnRef idx="1">
+            <a:schemeClr val="accent1"/>
+          </a:lnRef>
+          <a:fillRef idx="3">
+            <a:schemeClr val="accent1"/>
+          </a:fillRef>
+          <a:effectRef idx="2">
+            <a:schemeClr val="accent1"/>
+          </a:effectRef>
+          <a:fontRef idx="minor">
+            <a:schemeClr val="lt1"/>
+          </a:fontRef>
+        </p:style>
+        <p:txBody>
+          <a:bodyPr rtlCol="0" anchor="ctr"/>
+          <a:lstStyle/>
+          <a:p>
+            <a:pPr algn="ctr"/>
+            <a:endParaRPr lang="it-IT">
+              <a:solidFill>
+                <a:srgbClr val="003257"/>
+              </a:solidFill>
+            </a:endParaRPr>
+          </a:p>
+        </p:txBody>
+      </p:sp>
+      <p:sp>
+        <p:nvSpPr>
+          <p:cNvPr id="11" name="Segnaposto numero diapositiva 10"/>
+          <p:cNvSpPr>
+            <a:spLocks noGrp="1"/>
+          </p:cNvSpPr>
+          <p:nvPr>
+            <p:ph type="sldNum" sz="quarter" idx="12"/>
+          </p:nvPr>
+        </p:nvSpPr>
+        <p:spPr>
+          <a:xfrm>
+            <a:off x="6402163" y="6356350"/>
+            <a:ext cx="2133600" cy="365125"/>
+          </a:xfrm>
+        </p:spPr>
+        <p:txBody>
+          <a:bodyPr/>
+          <a:lstStyle/>
+          <a:p>
+            <a:fld id="{8EB8520A-26EA-DE4B-B141-4532FC98FF0E}" type="slidenum">
+              <a:rPr lang="it-IT" b="1" smtClean="0">
+                <a:solidFill>
+                  <a:schemeClr val="bg1"/>
+                </a:solidFill>
+                <a:latin typeface="Arial"/>
+                <a:cs typeface="Arial"/>
+              </a:rPr>
+              <a:pPr/>
+              <a:t>20</a:t>
+            </a:fld>
+            <a:endParaRPr lang="it-IT" b="1" dirty="0">
+              <a:solidFill>
+                <a:schemeClr val="bg1"/>
+              </a:solidFill>
+              <a:latin typeface="Arial"/>
+              <a:cs typeface="Arial"/>
+            </a:endParaRPr>
+          </a:p>
+        </p:txBody>
+      </p:sp>
+      <p:sp>
+        <p:nvSpPr>
+          <p:cNvPr id="10" name="CasellaDiTesto 9"/>
+          <p:cNvSpPr txBox="1"/>
+          <p:nvPr/>
+        </p:nvSpPr>
+        <p:spPr>
+          <a:xfrm>
+            <a:off x="5844956" y="51433"/>
+            <a:ext cx="2848857" cy="338554"/>
+          </a:xfrm>
+          <a:prstGeom prst="rect">
+            <a:avLst/>
+          </a:prstGeom>
+          <a:noFill/>
+        </p:spPr>
+        <p:txBody>
+          <a:bodyPr wrap="none" rtlCol="0">
+            <a:spAutoFit/>
+          </a:bodyPr>
+          <a:lstStyle/>
+          <a:p>
+            <a:pPr algn="r"/>
+            <a:r>
+              <a:rPr lang="it-IT" sz="800" b="1" dirty="0">
+                <a:solidFill>
+                  <a:schemeClr val="bg1"/>
+                </a:solidFill>
+                <a:latin typeface="Arial"/>
+                <a:cs typeface="Arial"/>
+              </a:rPr>
+              <a:t>Local </a:t>
+            </a:r>
+            <a:r>
+              <a:rPr lang="it-IT" sz="800" b="1" dirty="0" err="1">
+                <a:solidFill>
+                  <a:schemeClr val="bg1"/>
+                </a:solidFill>
+                <a:latin typeface="Arial"/>
+                <a:cs typeface="Arial"/>
+              </a:rPr>
+              <a:t>Binary</a:t>
+            </a:r>
+            <a:r>
+              <a:rPr lang="it-IT" sz="800" b="1" dirty="0">
+                <a:solidFill>
+                  <a:schemeClr val="bg1"/>
+                </a:solidFill>
+                <a:latin typeface="Arial"/>
+                <a:cs typeface="Arial"/>
+              </a:rPr>
+              <a:t> Pattern</a:t>
+            </a:r>
+          </a:p>
+          <a:p>
+            <a:pPr algn="r"/>
+            <a:r>
+              <a:rPr lang="it-IT" sz="800" b="1" dirty="0" err="1">
+                <a:solidFill>
+                  <a:schemeClr val="bg1"/>
+                </a:solidFill>
+                <a:latin typeface="Arial"/>
+                <a:cs typeface="Arial"/>
+              </a:rPr>
+              <a:t>Comparison</a:t>
+            </a:r>
+            <a:r>
+              <a:rPr lang="it-IT" sz="800" b="1" dirty="0">
+                <a:solidFill>
+                  <a:schemeClr val="bg1"/>
+                </a:solidFill>
+                <a:latin typeface="Arial"/>
+                <a:cs typeface="Arial"/>
+              </a:rPr>
+              <a:t> </a:t>
+            </a:r>
+            <a:r>
+              <a:rPr lang="it-IT" sz="800" b="1" dirty="0" err="1">
+                <a:solidFill>
+                  <a:schemeClr val="bg1"/>
+                </a:solidFill>
+                <a:latin typeface="Arial"/>
+                <a:cs typeface="Arial"/>
+              </a:rPr>
+              <a:t>between</a:t>
+            </a:r>
+            <a:r>
+              <a:rPr lang="it-IT" sz="800" b="1" dirty="0">
+                <a:solidFill>
+                  <a:schemeClr val="bg1"/>
+                </a:solidFill>
+                <a:latin typeface="Arial"/>
+                <a:cs typeface="Arial"/>
+              </a:rPr>
+              <a:t> a </a:t>
+            </a:r>
+            <a:r>
+              <a:rPr lang="it-IT" sz="800" b="1" dirty="0" err="1">
+                <a:solidFill>
+                  <a:schemeClr val="bg1"/>
+                </a:solidFill>
+                <a:latin typeface="Arial"/>
+                <a:cs typeface="Arial"/>
+              </a:rPr>
+              <a:t>sequential</a:t>
+            </a:r>
+            <a:r>
+              <a:rPr lang="it-IT" sz="800" b="1" dirty="0">
+                <a:solidFill>
+                  <a:schemeClr val="bg1"/>
+                </a:solidFill>
+                <a:latin typeface="Arial"/>
+                <a:cs typeface="Arial"/>
+              </a:rPr>
+              <a:t> and </a:t>
+            </a:r>
+            <a:r>
+              <a:rPr lang="it-IT" sz="800" b="1" dirty="0" err="1">
+                <a:solidFill>
+                  <a:schemeClr val="bg1"/>
+                </a:solidFill>
+                <a:latin typeface="Arial"/>
+                <a:cs typeface="Arial"/>
+              </a:rPr>
+              <a:t>parallel</a:t>
+            </a:r>
+            <a:r>
+              <a:rPr lang="it-IT" sz="800" b="1" dirty="0">
+                <a:solidFill>
+                  <a:schemeClr val="bg1"/>
+                </a:solidFill>
+                <a:latin typeface="Arial"/>
+                <a:cs typeface="Arial"/>
+              </a:rPr>
+              <a:t> </a:t>
+            </a:r>
+            <a:r>
+              <a:rPr lang="it-IT" sz="800" b="1" dirty="0" err="1">
+                <a:solidFill>
+                  <a:schemeClr val="bg1"/>
+                </a:solidFill>
+                <a:latin typeface="Arial"/>
+                <a:cs typeface="Arial"/>
+              </a:rPr>
+              <a:t>version</a:t>
+            </a:r>
+            <a:endParaRPr lang="it-IT" sz="800" b="1" dirty="0">
+              <a:solidFill>
+                <a:schemeClr val="bg1"/>
+              </a:solidFill>
+              <a:latin typeface="Arial"/>
+              <a:cs typeface="Arial"/>
+            </a:endParaRPr>
+          </a:p>
+        </p:txBody>
+      </p:sp>
+      <p:sp>
+        <p:nvSpPr>
+          <p:cNvPr id="14" name="CasellaDiTesto 13"/>
+          <p:cNvSpPr txBox="1"/>
+          <p:nvPr/>
+        </p:nvSpPr>
+        <p:spPr>
+          <a:xfrm>
+            <a:off x="7082015" y="403482"/>
+            <a:ext cx="1621846" cy="492443"/>
+          </a:xfrm>
+          <a:prstGeom prst="rect">
+            <a:avLst/>
+          </a:prstGeom>
+          <a:noFill/>
+        </p:spPr>
+        <p:txBody>
+          <a:bodyPr wrap="none" rtlCol="0">
+            <a:spAutoFit/>
+          </a:bodyPr>
+          <a:lstStyle/>
+          <a:p>
+            <a:pPr algn="r"/>
+            <a:r>
+              <a:rPr lang="it-IT" sz="800" dirty="0">
+                <a:solidFill>
+                  <a:schemeClr val="bg1"/>
+                </a:solidFill>
+                <a:latin typeface="Arial"/>
+                <a:cs typeface="Arial"/>
+              </a:rPr>
+              <a:t>Firenze – 2/2/2023</a:t>
+            </a:r>
+          </a:p>
+          <a:p>
+            <a:endParaRPr lang="it-IT" dirty="0"/>
+          </a:p>
+        </p:txBody>
+      </p:sp>
+      <p:pic>
+        <p:nvPicPr>
+          <p:cNvPr id="4" name="Immagine 3">
+            <a:extLst>
+              <a:ext uri="{FF2B5EF4-FFF2-40B4-BE49-F238E27FC236}">
+                <a16:creationId xmlns:a16="http://schemas.microsoft.com/office/drawing/2014/main" id="{6E26CAFB-1803-ECFF-1F7A-06C863913320}"/>
+              </a:ext>
+            </a:extLst>
+          </p:cNvPr>
+          <p:cNvPicPr>
+            <a:picLocks noChangeAspect="1"/>
+          </p:cNvPicPr>
+          <p:nvPr/>
+        </p:nvPicPr>
+        <p:blipFill>
+          <a:blip r:embed="rId4"/>
+          <a:stretch>
+            <a:fillRect/>
+          </a:stretch>
+        </p:blipFill>
+        <p:spPr>
+          <a:xfrm>
+            <a:off x="548914" y="2308292"/>
+            <a:ext cx="3611658" cy="1926217"/>
+          </a:xfrm>
+          <a:prstGeom prst="rect">
+            <a:avLst/>
+          </a:prstGeom>
+        </p:spPr>
+      </p:pic>
+      <p:pic>
+        <p:nvPicPr>
+          <p:cNvPr id="9" name="Immagine 8">
+            <a:extLst>
+              <a:ext uri="{FF2B5EF4-FFF2-40B4-BE49-F238E27FC236}">
+                <a16:creationId xmlns:a16="http://schemas.microsoft.com/office/drawing/2014/main" id="{0611957E-F026-1804-EEBD-40FE5DB1E60B}"/>
+              </a:ext>
+            </a:extLst>
+          </p:cNvPr>
+          <p:cNvPicPr>
+            <a:picLocks noChangeAspect="1"/>
+          </p:cNvPicPr>
+          <p:nvPr/>
+        </p:nvPicPr>
+        <p:blipFill>
+          <a:blip r:embed="rId5"/>
+          <a:stretch>
+            <a:fillRect/>
+          </a:stretch>
+        </p:blipFill>
+        <p:spPr>
+          <a:xfrm>
+            <a:off x="4852674" y="2416910"/>
+            <a:ext cx="3635736" cy="1926217"/>
+          </a:xfrm>
+          <a:prstGeom prst="rect">
+            <a:avLst/>
+          </a:prstGeom>
+        </p:spPr>
+      </p:pic>
+      <p:pic>
+        <p:nvPicPr>
+          <p:cNvPr id="17" name="Immagine 16" descr="Immagine che contiene tavolo&#10;&#10;Descrizione generata automaticamente">
+            <a:extLst>
+              <a:ext uri="{FF2B5EF4-FFF2-40B4-BE49-F238E27FC236}">
+                <a16:creationId xmlns:a16="http://schemas.microsoft.com/office/drawing/2014/main" id="{F450753F-839C-35C3-D96C-DC83F0D804BD}"/>
+              </a:ext>
+            </a:extLst>
+          </p:cNvPr>
+          <p:cNvPicPr>
+            <a:picLocks noChangeAspect="1"/>
+          </p:cNvPicPr>
+          <p:nvPr/>
+        </p:nvPicPr>
+        <p:blipFill>
+          <a:blip r:embed="rId6"/>
+          <a:stretch>
+            <a:fillRect/>
+          </a:stretch>
+        </p:blipFill>
+        <p:spPr>
+          <a:xfrm>
+            <a:off x="509966" y="4479674"/>
+            <a:ext cx="3512319" cy="1858079"/>
+          </a:xfrm>
+          <a:prstGeom prst="rect">
+            <a:avLst/>
+          </a:prstGeom>
+        </p:spPr>
+      </p:pic>
+      <p:pic>
+        <p:nvPicPr>
+          <p:cNvPr id="20" name="Immagine 19">
+            <a:extLst>
+              <a:ext uri="{FF2B5EF4-FFF2-40B4-BE49-F238E27FC236}">
+                <a16:creationId xmlns:a16="http://schemas.microsoft.com/office/drawing/2014/main" id="{0131D592-73CC-C9EF-070A-4C62881590B4}"/>
+              </a:ext>
+            </a:extLst>
+          </p:cNvPr>
+          <p:cNvPicPr>
+            <a:picLocks noChangeAspect="1"/>
+          </p:cNvPicPr>
+          <p:nvPr/>
+        </p:nvPicPr>
+        <p:blipFill>
+          <a:blip r:embed="rId7"/>
+          <a:stretch>
+            <a:fillRect/>
+          </a:stretch>
+        </p:blipFill>
+        <p:spPr>
+          <a:xfrm>
+            <a:off x="4852674" y="4444708"/>
+            <a:ext cx="3512319" cy="1800163"/>
+          </a:xfrm>
+          <a:prstGeom prst="rect">
+            <a:avLst/>
+          </a:prstGeom>
+        </p:spPr>
+      </p:pic>
+    </p:spTree>
+    <p:extLst>
+      <p:ext uri="{BB962C8B-B14F-4D97-AF65-F5344CB8AC3E}">
+        <p14:creationId xmlns:p14="http://schemas.microsoft.com/office/powerpoint/2010/main" val="1382413316"/>
       </p:ext>
     </p:extLst>
   </p:cSld>

</xml_diff>

<commit_message>
Added linear interpolation eq
</commit_message>
<xml_diff>
--- a/presentation/LocalBinaryPattern.pptx
+++ b/presentation/LocalBinaryPattern.pptx
@@ -263,7 +263,7 @@
             <a:fld id="{45BF3CCC-77DD-F84F-A249-CA3C5045A043}" type="datetime1">
               <a:rPr lang="it-IT" smtClean="0"/>
               <a:pPr/>
-              <a:t>27/01/2023</a:t>
+              <a:t>28/01/2023</a:t>
             </a:fld>
             <a:endParaRPr lang="it-IT"/>
           </a:p>
@@ -431,7 +431,7 @@
             <a:fld id="{FE692227-D6DC-FD45-9507-DB2BAD58473C}" type="datetime1">
               <a:rPr lang="it-IT" smtClean="0"/>
               <a:pPr/>
-              <a:t>27/01/2023</a:t>
+              <a:t>28/01/2023</a:t>
             </a:fld>
             <a:endParaRPr lang="it-IT"/>
           </a:p>
@@ -2495,7 +2495,7 @@
             <a:fld id="{AD8BF249-6BAC-CD40-AAE9-334F110649E5}" type="datetimeFigureOut">
               <a:rPr lang="it-IT" smtClean="0"/>
               <a:pPr/>
-              <a:t>27/01/2023</a:t>
+              <a:t>28/01/2023</a:t>
             </a:fld>
             <a:endParaRPr lang="it-IT"/>
           </a:p>
@@ -2665,7 +2665,7 @@
             <a:fld id="{AD8BF249-6BAC-CD40-AAE9-334F110649E5}" type="datetimeFigureOut">
               <a:rPr lang="it-IT" smtClean="0"/>
               <a:pPr/>
-              <a:t>27/01/2023</a:t>
+              <a:t>28/01/2023</a:t>
             </a:fld>
             <a:endParaRPr lang="it-IT"/>
           </a:p>
@@ -2845,7 +2845,7 @@
             <a:fld id="{AD8BF249-6BAC-CD40-AAE9-334F110649E5}" type="datetimeFigureOut">
               <a:rPr lang="it-IT" smtClean="0"/>
               <a:pPr/>
-              <a:t>27/01/2023</a:t>
+              <a:t>28/01/2023</a:t>
             </a:fld>
             <a:endParaRPr lang="it-IT"/>
           </a:p>
@@ -3015,7 +3015,7 @@
             <a:fld id="{AD8BF249-6BAC-CD40-AAE9-334F110649E5}" type="datetimeFigureOut">
               <a:rPr lang="it-IT" smtClean="0"/>
               <a:pPr/>
-              <a:t>27/01/2023</a:t>
+              <a:t>28/01/2023</a:t>
             </a:fld>
             <a:endParaRPr lang="it-IT"/>
           </a:p>
@@ -3262,7 +3262,7 @@
             <a:fld id="{AD8BF249-6BAC-CD40-AAE9-334F110649E5}" type="datetimeFigureOut">
               <a:rPr lang="it-IT" smtClean="0"/>
               <a:pPr/>
-              <a:t>27/01/2023</a:t>
+              <a:t>28/01/2023</a:t>
             </a:fld>
             <a:endParaRPr lang="it-IT"/>
           </a:p>
@@ -3549,7 +3549,7 @@
             <a:fld id="{AD8BF249-6BAC-CD40-AAE9-334F110649E5}" type="datetimeFigureOut">
               <a:rPr lang="it-IT" smtClean="0"/>
               <a:pPr/>
-              <a:t>27/01/2023</a:t>
+              <a:t>28/01/2023</a:t>
             </a:fld>
             <a:endParaRPr lang="it-IT"/>
           </a:p>
@@ -3970,7 +3970,7 @@
             <a:fld id="{AD8BF249-6BAC-CD40-AAE9-334F110649E5}" type="datetimeFigureOut">
               <a:rPr lang="it-IT" smtClean="0"/>
               <a:pPr/>
-              <a:t>27/01/2023</a:t>
+              <a:t>28/01/2023</a:t>
             </a:fld>
             <a:endParaRPr lang="it-IT"/>
           </a:p>
@@ -4089,7 +4089,7 @@
             <a:fld id="{AD8BF249-6BAC-CD40-AAE9-334F110649E5}" type="datetimeFigureOut">
               <a:rPr lang="it-IT" smtClean="0"/>
               <a:pPr/>
-              <a:t>27/01/2023</a:t>
+              <a:t>28/01/2023</a:t>
             </a:fld>
             <a:endParaRPr lang="it-IT"/>
           </a:p>
@@ -4186,7 +4186,7 @@
             <a:fld id="{AD8BF249-6BAC-CD40-AAE9-334F110649E5}" type="datetimeFigureOut">
               <a:rPr lang="it-IT" smtClean="0"/>
               <a:pPr/>
-              <a:t>27/01/2023</a:t>
+              <a:t>28/01/2023</a:t>
             </a:fld>
             <a:endParaRPr lang="it-IT"/>
           </a:p>
@@ -4463,7 +4463,7 @@
             <a:fld id="{AD8BF249-6BAC-CD40-AAE9-334F110649E5}" type="datetimeFigureOut">
               <a:rPr lang="it-IT" smtClean="0"/>
               <a:pPr/>
-              <a:t>27/01/2023</a:t>
+              <a:t>28/01/2023</a:t>
             </a:fld>
             <a:endParaRPr lang="it-IT"/>
           </a:p>
@@ -4717,7 +4717,7 @@
             <a:fld id="{AD8BF249-6BAC-CD40-AAE9-334F110649E5}" type="datetimeFigureOut">
               <a:rPr lang="it-IT" smtClean="0"/>
               <a:pPr/>
-              <a:t>27/01/2023</a:t>
+              <a:t>28/01/2023</a:t>
             </a:fld>
             <a:endParaRPr lang="it-IT"/>
           </a:p>
@@ -4930,7 +4930,7 @@
             <a:fld id="{AD8BF249-6BAC-CD40-AAE9-334F110649E5}" type="datetimeFigureOut">
               <a:rPr lang="it-IT" smtClean="0"/>
               <a:pPr/>
-              <a:t>27/01/2023</a:t>
+              <a:t>28/01/2023</a:t>
             </a:fld>
             <a:endParaRPr lang="it-IT"/>
           </a:p>
@@ -13394,7 +13394,7 @@
         </p:blipFill>
         <p:spPr>
           <a:xfrm>
-            <a:off x="574185" y="5102992"/>
+            <a:off x="611218" y="4447422"/>
             <a:ext cx="5270771" cy="558829"/>
           </a:xfrm>
           <a:prstGeom prst="rect">
@@ -13402,6 +13402,72 @@
           </a:prstGeom>
         </p:spPr>
       </p:pic>
+      <p:pic>
+        <p:nvPicPr>
+          <p:cNvPr id="5" name="Immagine 4" descr="Immagine che contiene testo, orologio, calibro&#10;&#10;Descrizione generata automaticamente">
+            <a:extLst>
+              <a:ext uri="{FF2B5EF4-FFF2-40B4-BE49-F238E27FC236}">
+                <a16:creationId xmlns:a16="http://schemas.microsoft.com/office/drawing/2014/main" id="{B2107144-7BDA-460A-A21F-F81052920A92}"/>
+              </a:ext>
+            </a:extLst>
+          </p:cNvPr>
+          <p:cNvPicPr>
+            <a:picLocks noChangeAspect="1"/>
+          </p:cNvPicPr>
+          <p:nvPr/>
+        </p:nvPicPr>
+        <p:blipFill>
+          <a:blip r:embed="rId7"/>
+          <a:stretch>
+            <a:fillRect/>
+          </a:stretch>
+        </p:blipFill>
+        <p:spPr>
+          <a:xfrm>
+            <a:off x="611218" y="5985928"/>
+            <a:ext cx="2673487" cy="488975"/>
+          </a:xfrm>
+          <a:prstGeom prst="rect">
+            <a:avLst/>
+          </a:prstGeom>
+        </p:spPr>
+      </p:pic>
+      <p:sp>
+        <p:nvSpPr>
+          <p:cNvPr id="13" name="CasellaDiTesto 12">
+            <a:extLst>
+              <a:ext uri="{FF2B5EF4-FFF2-40B4-BE49-F238E27FC236}">
+                <a16:creationId xmlns:a16="http://schemas.microsoft.com/office/drawing/2014/main" id="{4DC718B7-B862-2D6F-4985-05D0B775657C}"/>
+              </a:ext>
+            </a:extLst>
+          </p:cNvPr>
+          <p:cNvSpPr txBox="1"/>
+          <p:nvPr/>
+        </p:nvSpPr>
+        <p:spPr>
+          <a:xfrm>
+            <a:off x="576354" y="5427950"/>
+            <a:ext cx="7819027" cy="307777"/>
+          </a:xfrm>
+          <a:prstGeom prst="rect">
+            <a:avLst/>
+          </a:prstGeom>
+          <a:noFill/>
+        </p:spPr>
+        <p:txBody>
+          <a:bodyPr wrap="square" rtlCol="0">
+            <a:spAutoFit/>
+          </a:bodyPr>
+          <a:lstStyle/>
+          <a:p>
+            <a:pPr algn="just"/>
+            <a:r>
+              <a:rPr lang="en-US" sz="1400" dirty="0"/>
+              <a:t>If only one of the coordinates needs to be interpolated:</a:t>
+            </a:r>
+          </a:p>
+        </p:txBody>
+      </p:sp>
     </p:spTree>
     <p:extLst>
       <p:ext uri="{BB962C8B-B14F-4D97-AF65-F5344CB8AC3E}">

</xml_diff>